<commit_message>
added twitter and github symbols to slides.
</commit_message>
<xml_diff>
--- a/Day 1/Lecture Slides/Day 1 Slides.pptx
+++ b/Day 1/Lecture Slides/Day 1 Slides.pptx
@@ -268,7 +268,7 @@
           <a:p>
             <a:fld id="{C1BA31B9-3973-47BB-A769-C9355840A371}" type="datetimeFigureOut">
               <a:rPr lang="en-US" smtClean="0"/>
-              <a:t>1/2/2017</a:t>
+              <a:t>1/3/2017</a:t>
             </a:fld>
             <a:endParaRPr lang="en-US"/>
           </a:p>
@@ -5277,7 +5277,7 @@
           <a:p>
             <a:fld id="{90187E87-00B9-445A-8D49-C5EA21AFF997}" type="datetime1">
               <a:rPr lang="en-US" smtClean="0"/>
-              <a:t>1/2/2017</a:t>
+              <a:t>1/3/2017</a:t>
             </a:fld>
             <a:endParaRPr lang="en-US"/>
           </a:p>
@@ -5498,7 +5498,7 @@
           <a:p>
             <a:fld id="{096F9D19-0B27-4869-88F9-365098868A7F}" type="datetime1">
               <a:rPr lang="en-US" smtClean="0"/>
-              <a:t>1/2/2017</a:t>
+              <a:t>1/3/2017</a:t>
             </a:fld>
             <a:endParaRPr lang="en-US"/>
           </a:p>
@@ -5678,7 +5678,7 @@
           <a:p>
             <a:fld id="{AD3B7F37-9439-40A1-AEEF-AD67BB0D4AAC}" type="datetime1">
               <a:rPr lang="en-US" smtClean="0"/>
-              <a:t>1/2/2017</a:t>
+              <a:t>1/3/2017</a:t>
             </a:fld>
             <a:endParaRPr lang="en-US"/>
           </a:p>
@@ -5927,7 +5927,7 @@
             </a:pPr>
             <a:fld id="{68164054-3012-482D-9EB5-FE9FE872DCFE}" type="datetime1">
               <a:rPr lang="en-US" smtClean="0"/>
-              <a:t>1/2/2017</a:t>
+              <a:t>1/3/2017</a:t>
             </a:fld>
             <a:endParaRPr lang="en-US"/>
           </a:p>
@@ -6124,7 +6124,7 @@
           <a:p>
             <a:fld id="{6186BA2A-CEBF-4FAC-A01D-170852E3EB13}" type="datetime1">
               <a:rPr lang="en-US" smtClean="0"/>
-              <a:t>1/2/2017</a:t>
+              <a:t>1/3/2017</a:t>
             </a:fld>
             <a:endParaRPr lang="en-US"/>
           </a:p>
@@ -6382,7 +6382,7 @@
           <a:p>
             <a:fld id="{B5212E68-AB57-4F56-9514-81BEE86EE853}" type="datetime1">
               <a:rPr lang="en-US" smtClean="0"/>
-              <a:t>1/2/2017</a:t>
+              <a:t>1/3/2017</a:t>
             </a:fld>
             <a:endParaRPr lang="en-US"/>
           </a:p>
@@ -6705,7 +6705,7 @@
           <a:p>
             <a:fld id="{E41FD155-039D-4424-A31E-3636442F6E36}" type="datetime1">
               <a:rPr lang="en-US" smtClean="0"/>
-              <a:t>1/2/2017</a:t>
+              <a:t>1/3/2017</a:t>
             </a:fld>
             <a:endParaRPr lang="en-US"/>
           </a:p>
@@ -7129,7 +7129,7 @@
           <a:p>
             <a:fld id="{64126646-2279-486A-B40D-6145D7D6D51B}" type="datetime1">
               <a:rPr lang="en-US" smtClean="0"/>
-              <a:t>1/2/2017</a:t>
+              <a:t>1/3/2017</a:t>
             </a:fld>
             <a:endParaRPr lang="en-US"/>
           </a:p>
@@ -7247,7 +7247,7 @@
           <a:p>
             <a:fld id="{EB0B8D8C-4F8E-4FB9-992A-BE6AEAF72144}" type="datetime1">
               <a:rPr lang="en-US" smtClean="0"/>
-              <a:t>1/2/2017</a:t>
+              <a:t>1/3/2017</a:t>
             </a:fld>
             <a:endParaRPr lang="en-US"/>
           </a:p>
@@ -7342,7 +7342,7 @@
           <a:p>
             <a:fld id="{535ABF41-E07B-4A76-B381-06013911A931}" type="datetime1">
               <a:rPr lang="en-US" smtClean="0"/>
-              <a:t>1/2/2017</a:t>
+              <a:t>1/3/2017</a:t>
             </a:fld>
             <a:endParaRPr lang="en-US"/>
           </a:p>
@@ -7632,7 +7632,7 @@
           <a:p>
             <a:fld id="{6FC7F623-53E3-4FED-9930-39EA7732EA27}" type="datetime1">
               <a:rPr lang="en-US" smtClean="0"/>
-              <a:t>1/2/2017</a:t>
+              <a:t>1/3/2017</a:t>
             </a:fld>
             <a:endParaRPr lang="en-US"/>
           </a:p>
@@ -7904,7 +7904,7 @@
           <a:p>
             <a:fld id="{FA00CAC2-29F8-40CA-B143-AB13DA75749C}" type="datetime1">
               <a:rPr lang="en-US" smtClean="0"/>
-              <a:t>1/2/2017</a:t>
+              <a:t>1/3/2017</a:t>
             </a:fld>
             <a:endParaRPr lang="en-US"/>
           </a:p>
@@ -8158,7 +8158,7 @@
           <a:p>
             <a:fld id="{2E5D7971-9A78-471E-B993-894E22B9485D}" type="datetime1">
               <a:rPr lang="en-US" smtClean="0"/>
-              <a:t>1/2/2017</a:t>
+              <a:t>1/3/2017</a:t>
             </a:fld>
             <a:endParaRPr lang="en-US"/>
           </a:p>
@@ -8713,7 +8713,7 @@
         </p:blipFill>
         <p:spPr>
           <a:xfrm>
-            <a:off x="9335040" y="5318977"/>
+            <a:off x="9491559" y="5426069"/>
             <a:ext cx="2284699" cy="1268008"/>
           </a:xfrm>
           <a:prstGeom prst="rect">
@@ -8721,6 +8721,87 @@
           </a:prstGeom>
         </p:spPr>
       </p:pic>
+      <p:sp>
+        <p:nvSpPr>
+          <p:cNvPr id="5" name="TextBox 4"/>
+          <p:cNvSpPr txBox="1"/>
+          <p:nvPr/>
+        </p:nvSpPr>
+        <p:spPr>
+          <a:xfrm>
+            <a:off x="277957" y="6174747"/>
+            <a:ext cx="3146439" cy="400110"/>
+          </a:xfrm>
+          <a:prstGeom prst="rect">
+            <a:avLst/>
+          </a:prstGeom>
+          <a:noFill/>
+        </p:spPr>
+        <p:txBody>
+          <a:bodyPr wrap="none" rtlCol="0">
+            <a:spAutoFit/>
+          </a:bodyPr>
+          <a:lstStyle/>
+          <a:p>
+            <a:r>
+              <a:rPr lang="en-US" sz="2000" dirty="0" smtClean="0">
+                <a:solidFill>
+                  <a:srgbClr val="FFC000"/>
+                </a:solidFill>
+                <a:latin typeface="FontAwesome" pitchFamily="2" charset="0"/>
+              </a:rPr>
+              <a:t></a:t>
+            </a:r>
+            <a:r>
+              <a:rPr lang="en-US" dirty="0" smtClean="0">
+                <a:solidFill>
+                  <a:srgbClr val="FFC000"/>
+                </a:solidFill>
+                <a:latin typeface="FontAwesome" pitchFamily="2" charset="0"/>
+              </a:rPr>
+              <a:t> </a:t>
+            </a:r>
+            <a:r>
+              <a:rPr lang="en-US" sz="1400" dirty="0" smtClean="0">
+                <a:solidFill>
+                  <a:srgbClr val="FFC000"/>
+                </a:solidFill>
+              </a:rPr>
+              <a:t>@RandiLGarcia   </a:t>
+            </a:r>
+            <a:r>
+              <a:rPr lang="en-US" sz="2000" dirty="0" smtClean="0">
+                <a:solidFill>
+                  <a:srgbClr val="FFC000"/>
+                </a:solidFill>
+                <a:latin typeface="FontAwesome" pitchFamily="2" charset="0"/>
+              </a:rPr>
+              <a:t></a:t>
+            </a:r>
+            <a:r>
+              <a:rPr lang="en-US" sz="2000" dirty="0" smtClean="0">
+                <a:solidFill>
+                  <a:srgbClr val="FFC000"/>
+                </a:solidFill>
+              </a:rPr>
+              <a:t> </a:t>
+            </a:r>
+            <a:r>
+              <a:rPr lang="en-US" sz="1600" dirty="0" smtClean="0">
+                <a:solidFill>
+                  <a:srgbClr val="FFC000"/>
+                </a:solidFill>
+              </a:rPr>
+              <a:t>RandiLGarcia</a:t>
+            </a:r>
+            <a:endParaRPr lang="en-US" sz="1600" dirty="0">
+              <a:solidFill>
+                <a:srgbClr val="FFC000"/>
+              </a:solidFill>
+            </a:endParaRPr>
+          </a:p>
+        </p:txBody>
+      </p:sp>
     </p:spTree>
     <p:extLst>
       <p:ext uri="{BB962C8B-B14F-4D97-AF65-F5344CB8AC3E}">
@@ -18616,7 +18697,7 @@
           <a:graphicData uri="http://schemas.openxmlformats.org/presentationml/2006/ole">
             <mc:AlternateContent xmlns:mc="http://schemas.openxmlformats.org/markup-compatibility/2006">
               <mc:Choice xmlns:v="urn:schemas-microsoft-com:vml" Requires="v">
-                <p:oleObj spid="_x0000_s1043" name="Document" r:id="rId4" imgW="8020685" imgH="4488065" progId="Word.Document.8">
+                <p:oleObj spid="_x0000_s1045" name="Document" r:id="rId4" imgW="8020685" imgH="4488065" progId="Word.Document.8">
                   <p:embed/>
                 </p:oleObj>
               </mc:Choice>
@@ -28025,7 +28106,7 @@
             </p:spPr>
             <p:txBody>
               <a:bodyPr>
-                <a:normAutofit lnSpcReduction="10000"/>
+                <a:normAutofit/>
               </a:bodyPr>
               <a:lstStyle/>
               <a:p>
@@ -28309,7 +28390,7 @@
               <a:blipFill rotWithShape="0">
                 <a:blip r:embed="rId3"/>
                 <a:stretch>
-                  <a:fillRect t="-754"/>
+                  <a:fillRect b="-2413"/>
                 </a:stretch>
               </a:blipFill>
             </p:spPr>

</xml_diff>

<commit_message>
updated common fate, added spghetti plot.
</commit_message>
<xml_diff>
--- a/Day 1/Lecture Slides/Day 1 Slides.pptx
+++ b/Day 1/Lecture Slides/Day 1 Slides.pptx
@@ -9124,11 +9124,7 @@
             <a:pPr lvl="1"/>
             <a:r>
               <a:rPr lang="en-US" dirty="0" smtClean="0"/>
-              <a:t>Percent </a:t>
-            </a:r>
-            <a:r>
-              <a:rPr lang="en-US" dirty="0" smtClean="0"/>
-              <a:t>time talking in a dyad</a:t>
+              <a:t>Percent time talking in a dyad</a:t>
             </a:r>
           </a:p>
           <a:p>
@@ -9161,13 +9157,8 @@
             </a:r>
             <a:r>
               <a:rPr lang="en-US" dirty="0" smtClean="0"/>
-              <a:t> be distinguished on that variable</a:t>
-            </a:r>
-            <a:r>
-              <a:rPr lang="en-US" dirty="0" smtClean="0"/>
-              <a:t>. But that doesn’t mean it would be theoretically meaningful to do so.</a:t>
-            </a:r>
-            <a:endParaRPr lang="en-US" dirty="0" smtClean="0"/>
+              <a:t> be distinguished on that variable. But that doesn’t mean it would be theoretically meaningful to do so.</a:t>
+            </a:r>
           </a:p>
           <a:p>
             <a:pPr lvl="1"/>
@@ -10144,11 +10135,7 @@
             <a:pPr lvl="1"/>
             <a:r>
               <a:rPr lang="en-US" dirty="0" smtClean="0"/>
-              <a:t>Lots-o </a:t>
-            </a:r>
-            <a:r>
-              <a:rPr lang="en-US" dirty="0" smtClean="0"/>
-              <a:t>personality variables</a:t>
+              <a:t>Lots-o personality variables</a:t>
             </a:r>
           </a:p>
           <a:p>
@@ -10536,19 +10523,7 @@
             </a:pPr>
             <a:r>
               <a:rPr lang="en-US" sz="3200" dirty="0" smtClean="0"/>
-              <a:t>Can you think of a </a:t>
-            </a:r>
-            <a:r>
-              <a:rPr lang="en-US" sz="3200" dirty="0" smtClean="0"/>
-              <a:t>variable </a:t>
-            </a:r>
-            <a:r>
-              <a:rPr lang="en-US" sz="3200" dirty="0" smtClean="0"/>
-              <a:t>that can </a:t>
-            </a:r>
-            <a:r>
-              <a:rPr lang="en-US" sz="3200" dirty="0" smtClean="0"/>
-              <a:t>be </a:t>
+              <a:t>Can you think of a variable that can be </a:t>
             </a:r>
             <a:r>
               <a:rPr lang="en-US" sz="3200" b="1" dirty="0" smtClean="0"/>
@@ -10576,13 +10551,8 @@
             </a:r>
             <a:r>
               <a:rPr lang="en-US" sz="3200" dirty="0" smtClean="0"/>
-              <a:t>a</a:t>
-            </a:r>
-            <a:r>
-              <a:rPr lang="en-US" sz="3200" dirty="0" smtClean="0"/>
-              <a:t>cross different samples? </a:t>
-            </a:r>
-            <a:endParaRPr lang="en-US" sz="3200" dirty="0" smtClean="0"/>
+              <a:t>across different samples? </a:t>
+            </a:r>
           </a:p>
         </p:txBody>
       </p:sp>
@@ -17517,11 +17487,7 @@
           <a:p>
             <a:r>
               <a:rPr lang="en-US" dirty="0" smtClean="0"/>
-              <a:t>R </a:t>
-            </a:r>
-            <a:r>
-              <a:rPr lang="en-US" dirty="0" smtClean="0"/>
-              <a:t>Demo</a:t>
+              <a:t>R Demo</a:t>
             </a:r>
             <a:endParaRPr lang="en-US" dirty="0"/>
           </a:p>
@@ -17604,11 +17570,7 @@
           <a:p>
             <a:r>
               <a:rPr lang="en-US" dirty="0" smtClean="0"/>
-              <a:t>Nonindependence </a:t>
-            </a:r>
-            <a:r>
-              <a:rPr lang="en-US" dirty="0" smtClean="0"/>
-              <a:t>in </a:t>
+              <a:t>Nonindependence in </a:t>
             </a:r>
             <a:r>
               <a:rPr lang="en-US" dirty="0" err="1" smtClean="0"/>
@@ -17897,13 +17859,8 @@
           <a:p>
             <a:r>
               <a:rPr lang="en-US" dirty="0" smtClean="0"/>
-              <a:t>Nonindependence is often defined as the proportion of variance explained by the </a:t>
-            </a:r>
-            <a:r>
-              <a:rPr lang="en-US" dirty="0" smtClean="0"/>
-              <a:t>dyad (or group).</a:t>
-            </a:r>
-            <a:endParaRPr lang="en-US" dirty="0" smtClean="0"/>
+              <a:t>Nonindependence is often defined as the proportion of variance explained by the dyad (or group).</a:t>
+            </a:r>
           </a:p>
           <a:p>
             <a:r>
@@ -18365,7 +18322,6 @@
               <a:rPr lang="en-US" sz="2600" dirty="0" smtClean="0"/>
               <a:t>Unbiased</a:t>
             </a:r>
-            <a:endParaRPr lang="en-US" sz="2600" dirty="0" smtClean="0"/>
           </a:p>
           <a:p>
             <a:r>
@@ -18377,11 +18333,7 @@
             <a:pPr lvl="1"/>
             <a:r>
               <a:rPr lang="en-US" sz="2800" dirty="0" smtClean="0"/>
-              <a:t>Standard </a:t>
-            </a:r>
-            <a:r>
-              <a:rPr lang="en-US" sz="2800" dirty="0" smtClean="0"/>
-              <a:t>Errors Biased</a:t>
+              <a:t>Standard Errors Biased</a:t>
             </a:r>
           </a:p>
           <a:p>
@@ -18402,13 +18354,8 @@
             <a:pPr lvl="2"/>
             <a:r>
               <a:rPr lang="en-US" sz="2400" dirty="0" smtClean="0"/>
-              <a:t>Sometimes hardly </a:t>
-            </a:r>
-            <a:r>
-              <a:rPr lang="en-US" sz="2400" dirty="0" smtClean="0"/>
-              <a:t>biased</a:t>
-            </a:r>
-            <a:endParaRPr lang="en-US" sz="2400" dirty="0" smtClean="0"/>
+              <a:t>Sometimes hardly biased</a:t>
+            </a:r>
           </a:p>
         </p:txBody>
       </p:sp>
@@ -19104,12 +19051,12 @@
           <a:graphicData uri="http://schemas.openxmlformats.org/presentationml/2006/ole">
             <mc:AlternateContent xmlns:mc="http://schemas.openxmlformats.org/markup-compatibility/2006">
               <mc:Choice xmlns:v="urn:schemas-microsoft-com:vml" Requires="v">
-                <p:oleObj spid="_x0000_s1060" name="Document" r:id="rId3" imgW="8020685" imgH="4488065" progId="Word.Document.8">
+                <p:oleObj spid="_x0000_s1061" name="Document" r:id="rId4" imgW="8020685" imgH="4488065" progId="Word.Document.8">
                   <p:embed/>
                 </p:oleObj>
               </mc:Choice>
               <mc:Fallback>
-                <p:oleObj name="Document" r:id="rId3" imgW="8020685" imgH="4488065" progId="Word.Document.8">
+                <p:oleObj name="Document" r:id="rId4" imgW="8020685" imgH="4488065" progId="Word.Document.8">
                   <p:embed/>
                   <p:pic>
                     <p:nvPicPr>
@@ -19120,7 +19067,7 @@
                       <p:nvPr/>
                     </p:nvPicPr>
                     <p:blipFill>
-                      <a:blip r:embed="rId4"/>
+                      <a:blip r:embed="rId5"/>
                       <a:srcRect/>
                       <a:stretch>
                         <a:fillRect/>
@@ -19838,8 +19785,8 @@
           </a:p>
         </p:txBody>
       </p:sp>
-      <mc:AlternateContent xmlns:mc="http://schemas.openxmlformats.org/markup-compatibility/2006">
-        <mc:Choice xmlns:a14="http://schemas.microsoft.com/office/drawing/2010/main" Requires="a14">
+      <mc:AlternateContent xmlns:mc="http://schemas.openxmlformats.org/markup-compatibility/2006" xmlns:a14="http://schemas.microsoft.com/office/drawing/2010/main">
+        <mc:Choice Requires="a14">
           <p:sp>
             <p:nvSpPr>
               <p:cNvPr id="27651" name="Rectangle 3"/>
@@ -20784,7 +20731,7 @@
             </p:txBody>
           </p:sp>
         </mc:Choice>
-        <mc:Fallback>
+        <mc:Fallback xmlns="">
           <p:sp>
             <p:nvSpPr>
               <p:cNvPr id="27651" name="Rectangle 3"/>
@@ -23642,13 +23589,8 @@
           <a:p>
             <a:r>
               <a:rPr lang="en-US" altLang="en-US" dirty="0" smtClean="0"/>
-              <a:t>All individuals are treated as actors and partners</a:t>
-            </a:r>
-            <a:r>
-              <a:rPr lang="en-US" altLang="en-US" dirty="0" smtClean="0"/>
-              <a:t>.</a:t>
-            </a:r>
-            <a:endParaRPr lang="en-US" altLang="en-US" dirty="0" smtClean="0"/>
+              <a:t>All individuals are treated as actors and partners.</a:t>
+            </a:r>
           </a:p>
         </p:txBody>
       </p:sp>
@@ -23904,19 +23846,7 @@
           <a:p>
             <a:r>
               <a:rPr lang="en-US" altLang="en-US" sz="2400" dirty="0" smtClean="0"/>
-              <a:t>Both X and Y are mixed </a:t>
-            </a:r>
-            <a:r>
-              <a:rPr lang="en-US" altLang="en-US" sz="2400" dirty="0" smtClean="0"/>
-              <a:t>variables—both </a:t>
-            </a:r>
-            <a:r>
-              <a:rPr lang="en-US" altLang="en-US" sz="2400" dirty="0" smtClean="0"/>
-              <a:t>members of the dyad have scores on X and Y</a:t>
-            </a:r>
-            <a:r>
-              <a:rPr lang="en-US" altLang="en-US" sz="2400" dirty="0" smtClean="0"/>
-              <a:t>.</a:t>
+              <a:t>Both X and Y are mixed variables—both members of the dyad have scores on X and Y.</a:t>
             </a:r>
           </a:p>
           <a:p>
@@ -24054,11 +23984,7 @@
           <a:p>
             <a:r>
               <a:rPr lang="en-US" altLang="en-US" sz="2400" dirty="0" smtClean="0"/>
-              <a:t>Both </a:t>
-            </a:r>
-            <a:r>
-              <a:rPr lang="en-US" altLang="en-US" sz="2400" dirty="0" smtClean="0"/>
-              <a:t>members of the dyad have an actor effect.</a:t>
+              <a:t>Both members of the dyad have an actor effect.</a:t>
             </a:r>
             <a:endParaRPr lang="en-US" altLang="en-US" sz="2400" dirty="0"/>
           </a:p>
@@ -24325,11 +24251,7 @@
           <a:p>
             <a:r>
               <a:rPr lang="en-US" altLang="en-US" sz="2400" dirty="0" smtClean="0"/>
-              <a:t>Definition: The effect of a person’s partner’s X variable on the person’s Y </a:t>
-            </a:r>
-            <a:r>
-              <a:rPr lang="en-US" altLang="en-US" sz="2400" dirty="0" smtClean="0"/>
-              <a:t>variable</a:t>
+              <a:t>Definition: The effect of a person’s partner’s X variable on the person’s Y variable</a:t>
             </a:r>
           </a:p>
           <a:p>
@@ -24343,11 +24265,7 @@
             <a:pPr lvl="1"/>
             <a:r>
               <a:rPr lang="en-US" altLang="en-US" sz="2400" dirty="0" smtClean="0"/>
-              <a:t>the </a:t>
-            </a:r>
-            <a:r>
-              <a:rPr lang="en-US" altLang="en-US" sz="2400" dirty="0" smtClean="0"/>
-              <a:t>effect of spouses’ depression on patients’ quality of life</a:t>
+              <a:t>the effect of spouses’ depression on patients’ quality of life</a:t>
             </a:r>
           </a:p>
           <a:p>
@@ -24357,11 +24275,7 @@
           <a:p>
             <a:r>
               <a:rPr lang="en-US" altLang="en-US" sz="2600" dirty="0" smtClean="0"/>
-              <a:t>Both </a:t>
-            </a:r>
-            <a:r>
-              <a:rPr lang="en-US" altLang="en-US" sz="2600" dirty="0" smtClean="0"/>
-              <a:t>members of the dyad have a partner effect.</a:t>
+              <a:t>Both members of the dyad have a partner effect.</a:t>
             </a:r>
           </a:p>
         </p:txBody>
@@ -25450,13 +25364,8 @@
             <a:pPr lvl="1"/>
             <a:r>
               <a:rPr lang="en-US" dirty="0" smtClean="0"/>
-              <a:t>Race in mixed race </a:t>
-            </a:r>
-            <a:r>
-              <a:rPr lang="en-US" dirty="0" smtClean="0"/>
-              <a:t>dyads</a:t>
-            </a:r>
-            <a:endParaRPr lang="en-US" dirty="0" smtClean="0"/>
+              <a:t>Race in mixed race dyads</a:t>
+            </a:r>
           </a:p>
         </p:txBody>
       </p:sp>
@@ -26554,19 +26463,7 @@
           <a:p>
             <a:r>
               <a:rPr lang="en-US" dirty="0" smtClean="0"/>
-              <a:t>Binary </a:t>
-            </a:r>
-            <a:r>
-              <a:rPr lang="en-US" dirty="0" smtClean="0"/>
-              <a:t>and </a:t>
-            </a:r>
-            <a:r>
-              <a:rPr lang="en-US" dirty="0" smtClean="0"/>
-              <a:t>Count Outcome </a:t>
-            </a:r>
-            <a:r>
-              <a:rPr lang="en-US" dirty="0" smtClean="0"/>
-              <a:t>variables</a:t>
+              <a:t>Binary and Count Outcome variables</a:t>
             </a:r>
             <a:endParaRPr lang="en-US" dirty="0"/>
           </a:p>
@@ -26649,15 +26546,7 @@
           <a:p>
             <a:r>
               <a:rPr lang="en-US" dirty="0" smtClean="0"/>
-              <a:t>Generalized </a:t>
-            </a:r>
-            <a:r>
-              <a:rPr lang="en-US" dirty="0" smtClean="0"/>
-              <a:t>Linear </a:t>
-            </a:r>
-            <a:r>
-              <a:rPr lang="en-US" dirty="0" smtClean="0"/>
-              <a:t>Models</a:t>
+              <a:t>Generalized Linear Models</a:t>
             </a:r>
             <a:endParaRPr lang="en-US" dirty="0"/>
           </a:p>
@@ -26680,19 +26569,7 @@
           <a:p>
             <a:r>
               <a:rPr lang="en-US" dirty="0" smtClean="0"/>
-              <a:t>In </a:t>
-            </a:r>
-            <a:r>
-              <a:rPr lang="en-US" dirty="0" smtClean="0"/>
-              <a:t>general we wrap the </a:t>
-            </a:r>
-            <a:r>
-              <a:rPr lang="en-US" dirty="0" smtClean="0"/>
-              <a:t>response variables </a:t>
-            </a:r>
-            <a:r>
-              <a:rPr lang="en-US" dirty="0" smtClean="0"/>
-              <a:t>in a link function (log, logit, </a:t>
+              <a:t>In general we wrap the response variables in a link function (log, logit, </a:t>
             </a:r>
             <a:r>
               <a:rPr lang="en-US" dirty="0" err="1" smtClean="0"/>
@@ -26706,24 +26583,15 @@
           <a:p>
             <a:r>
               <a:rPr lang="en-US" dirty="0" smtClean="0"/>
-              <a:t>For </a:t>
-            </a:r>
+              <a:t>For example </a:t>
+            </a:r>
+          </a:p>
+          <a:p>
+            <a:pPr lvl="1"/>
             <a:r>
               <a:rPr lang="en-US" dirty="0" smtClean="0"/>
-              <a:t>example </a:t>
-            </a:r>
-          </a:p>
-          <a:p>
-            <a:pPr lvl="1"/>
-            <a:r>
-              <a:rPr lang="en-US" dirty="0" smtClean="0"/>
-              <a:t>A </a:t>
-            </a:r>
-            <a:r>
-              <a:rPr lang="en-US" dirty="0" smtClean="0"/>
-              <a:t>logistic regression is a generalized linear model making use of a logit link function. </a:t>
-            </a:r>
-            <a:endParaRPr lang="en-US" dirty="0" smtClean="0"/>
+              <a:t>A logistic regression is a generalized linear model making use of a logit link function. </a:t>
+            </a:r>
           </a:p>
           <a:p>
             <a:pPr lvl="1"/>
@@ -26738,7 +26606,6 @@
               <a:rPr lang="en-US" dirty="0" smtClean="0"/>
               <a:t>A regression model is a generalized linear model making use of an “identity” link function—the response is multiplied by 1. </a:t>
             </a:r>
-            <a:endParaRPr lang="en-US" dirty="0" smtClean="0"/>
           </a:p>
           <a:p>
             <a:pPr lvl="1"/>
@@ -26799,18 +26666,14 @@
           <a:p>
             <a:r>
               <a:rPr lang="en-US" dirty="0" smtClean="0"/>
-              <a:t>Logistic </a:t>
-            </a:r>
-            <a:r>
-              <a:rPr lang="en-US" dirty="0" smtClean="0"/>
-              <a:t>Regression Review</a:t>
+              <a:t>Logistic Regression Review</a:t>
             </a:r>
             <a:endParaRPr lang="en-US" dirty="0"/>
           </a:p>
         </p:txBody>
       </p:sp>
-      <mc:AlternateContent xmlns:mc="http://schemas.openxmlformats.org/markup-compatibility/2006">
-        <mc:Choice xmlns:a14="http://schemas.microsoft.com/office/drawing/2010/main" Requires="a14">
+      <mc:AlternateContent xmlns:mc="http://schemas.openxmlformats.org/markup-compatibility/2006" xmlns:a14="http://schemas.microsoft.com/office/drawing/2010/main">
+        <mc:Choice Requires="a14">
           <p:sp>
             <p:nvSpPr>
               <p:cNvPr id="3" name="Content Placeholder 2"/>
@@ -26982,7 +26845,7 @@
             </p:txBody>
           </p:sp>
         </mc:Choice>
-        <mc:Fallback>
+        <mc:Fallback xmlns="">
           <p:sp>
             <p:nvSpPr>
               <p:cNvPr id="3" name="Content Placeholder 2"/>
@@ -28965,18 +28828,14 @@
           <a:p>
             <a:r>
               <a:rPr lang="en-US" dirty="0" smtClean="0"/>
-              <a:t>Log-Linear (Poisson) Regression </a:t>
-            </a:r>
-            <a:r>
-              <a:rPr lang="en-US" dirty="0" smtClean="0"/>
-              <a:t>Equation</a:t>
+              <a:t>Log-Linear (Poisson) Regression Equation</a:t>
             </a:r>
             <a:endParaRPr lang="en-US" dirty="0"/>
           </a:p>
         </p:txBody>
       </p:sp>
-      <mc:AlternateContent xmlns:mc="http://schemas.openxmlformats.org/markup-compatibility/2006">
-        <mc:Choice xmlns:a14="http://schemas.microsoft.com/office/drawing/2010/main" Requires="a14">
+      <mc:AlternateContent xmlns:mc="http://schemas.openxmlformats.org/markup-compatibility/2006" xmlns:a14="http://schemas.microsoft.com/office/drawing/2010/main">
+        <mc:Choice Requires="a14">
           <p:sp>
             <p:nvSpPr>
               <p:cNvPr id="3" name="Content Placeholder 2"/>
@@ -29295,15 +29154,7 @@
                 </a14:m>
                 <a:r>
                   <a:rPr lang="en-US" dirty="0" smtClean="0"/>
-                  <a:t> </a:t>
-                </a:r>
-                <a:r>
-                  <a:rPr lang="en-US" dirty="0" smtClean="0"/>
-                  <a:t>is the </a:t>
-                </a:r>
-                <a:r>
-                  <a:rPr lang="en-US" dirty="0" smtClean="0"/>
-                  <a:t>response </a:t>
+                  <a:t> is the response </a:t>
                 </a:r>
                 <a:r>
                   <a:rPr lang="en-US" dirty="0" err="1" smtClean="0"/>
@@ -29354,15 +29205,7 @@
                 </a14:m>
                 <a:r>
                   <a:rPr lang="en-US" dirty="0" smtClean="0"/>
-                  <a:t> is </a:t>
-                </a:r>
-                <a:r>
-                  <a:rPr lang="en-US" dirty="0" smtClean="0"/>
-                  <a:t>the “</a:t>
-                </a:r>
-                <a:r>
-                  <a:rPr lang="en-US" dirty="0" smtClean="0"/>
-                  <a:t>log” link function</a:t>
+                  <a:t> is the “log” link function</a:t>
                 </a:r>
               </a:p>
               <a:p>
@@ -29481,7 +29324,7 @@
             </p:txBody>
           </p:sp>
         </mc:Choice>
-        <mc:Fallback>
+        <mc:Fallback xmlns="">
           <p:sp>
             <p:nvSpPr>
               <p:cNvPr id="3" name="Content Placeholder 2"/>
@@ -29607,11 +29450,7 @@
             </a:r>
             <a:r>
               <a:rPr lang="en-US" dirty="0" smtClean="0"/>
-              <a:t>, identity, etc</a:t>
-            </a:r>
-            <a:r>
-              <a:rPr lang="en-US" dirty="0" smtClean="0"/>
-              <a:t>.).</a:t>
+              <a:t>, identity, etc.).</a:t>
             </a:r>
           </a:p>
           <a:p>
@@ -29628,15 +29467,7 @@
             <a:pPr lvl="1"/>
             <a:r>
               <a:rPr lang="en-US" dirty="0" smtClean="0"/>
-              <a:t>Do the same, include a link function that is appropriate for your response, but </a:t>
-            </a:r>
-            <a:r>
-              <a:rPr lang="en-US" dirty="0" smtClean="0"/>
-              <a:t>then </a:t>
-            </a:r>
-            <a:r>
-              <a:rPr lang="en-US" dirty="0" smtClean="0"/>
-              <a:t>include random effects in the model. </a:t>
+              <a:t>Do the same, include a link function that is appropriate for your response, but then include random effects in the model. </a:t>
             </a:r>
           </a:p>
           <a:p>
@@ -29645,7 +29476,6 @@
               <a:rPr lang="en-US" dirty="0" smtClean="0"/>
               <a:t>“Mixed” refers to the mixture of fixed and random effects in the model.  </a:t>
             </a:r>
-            <a:endParaRPr lang="en-US" dirty="0" smtClean="0"/>
           </a:p>
           <a:p>
             <a:pPr lvl="1"/>
@@ -29682,7 +29512,6 @@
               <a:rPr lang="en-US" dirty="0" smtClean="0"/>
               <a:t>function.</a:t>
             </a:r>
-            <a:endParaRPr lang="en-US" dirty="0" smtClean="0"/>
           </a:p>
           <a:p>
             <a:pPr lvl="1"/>
@@ -29782,11 +29611,7 @@
             <a:pPr lvl="1"/>
             <a:r>
               <a:rPr lang="en-US" dirty="0" smtClean="0"/>
-              <a:t>Multinomial outcome (Categories: home/work/leisure</a:t>
-            </a:r>
-            <a:r>
-              <a:rPr lang="en-US" dirty="0" smtClean="0"/>
-              <a:t>)</a:t>
+              <a:t>Multinomial outcome (Categories: home/work/leisure)</a:t>
             </a:r>
           </a:p>
           <a:p>
@@ -29800,15 +29625,7 @@
             <a:pPr lvl="1"/>
             <a:r>
               <a:rPr lang="en-US" dirty="0" smtClean="0"/>
-              <a:t>Can </a:t>
-            </a:r>
-            <a:r>
-              <a:rPr lang="en-US" dirty="0" smtClean="0"/>
-              <a:t>also be used for continuous outcomes (normal distribution</a:t>
-            </a:r>
-            <a:r>
-              <a:rPr lang="en-US" dirty="0" smtClean="0"/>
-              <a:t>)</a:t>
+              <a:t>Can also be used for continuous outcomes (normal distribution)</a:t>
             </a:r>
           </a:p>
           <a:p>
@@ -30944,15 +30761,7 @@
             <a:pPr lvl="2"/>
             <a:r>
               <a:rPr lang="en-US" dirty="0" smtClean="0"/>
-              <a:t>Example: Length </a:t>
-            </a:r>
-            <a:r>
-              <a:rPr lang="en-US" dirty="0" smtClean="0"/>
-              <a:t>of </a:t>
-            </a:r>
-            <a:r>
-              <a:rPr lang="en-US" dirty="0" smtClean="0"/>
-              <a:t>relationship</a:t>
+              <a:t>Example: Length of relationship</a:t>
             </a:r>
           </a:p>
           <a:p>

</xml_diff>